<commit_message>
- Updated and improved settingsMenu icons - Added initial support for switching the camera stereo mode and active camera - Implemented GUI drawing using PNG images (replaces the title drawing in text elements, although the code for it is still in the program in case it should ever need to be reverted - Moved grid and UI box drawing declarations so that they would draw above the PNG UI elements - renamed update_ui_display() to update_cli_display() - added if infoOverlay == True: draw_ui_background() inside draw_camera_video_stream() so it would draw the UI overlay if infoOverlay is true.
To do:
- make the current setting highlighted in the settings menu on the GUI
- implement the buttons icons into the GUI
</commit_message>
<xml_diff>
--- a/Raspberry Pi programs/app_icons/setting_cell_icons.pptx
+++ b/Raspberry Pi programs/app_icons/setting_cell_icons.pptx
@@ -4319,190 +4319,6 @@
       </p:grpSpPr>
       <p:sp>
         <p:nvSpPr>
-          <p:cNvPr id="4" name="Rectangle 3">
-            <a:extLst>
-              <a:ext uri="{FF2B5EF4-FFF2-40B4-BE49-F238E27FC236}">
-                <a16:creationId xmlns:a16="http://schemas.microsoft.com/office/drawing/2014/main" id="{57279BA0-4A3F-4FDE-8962-CF222B386DA9}"/>
-              </a:ext>
-            </a:extLst>
-          </p:cNvPr>
-          <p:cNvSpPr/>
-          <p:nvPr/>
-        </p:nvSpPr>
-        <p:spPr>
-          <a:xfrm>
-            <a:off x="0" y="0"/>
-            <a:ext cx="3600000" cy="46799500"/>
-          </a:xfrm>
-          <a:prstGeom prst="rect">
-            <a:avLst/>
-          </a:prstGeom>
-        </p:spPr>
-        <p:style>
-          <a:lnRef idx="2">
-            <a:schemeClr val="accent1">
-              <a:shade val="50000"/>
-            </a:schemeClr>
-          </a:lnRef>
-          <a:fillRef idx="1">
-            <a:schemeClr val="accent1"/>
-          </a:fillRef>
-          <a:effectRef idx="0">
-            <a:schemeClr val="accent1"/>
-          </a:effectRef>
-          <a:fontRef idx="minor">
-            <a:schemeClr val="lt1"/>
-          </a:fontRef>
-        </p:style>
-        <p:txBody>
-          <a:bodyPr rtlCol="0" anchor="ctr"/>
-          <a:lstStyle/>
-          <a:p>
-            <a:pPr algn="ctr"/>
-            <a:endParaRPr lang="en-GB"/>
-          </a:p>
-        </p:txBody>
-      </p:sp>
-      <p:sp>
-        <p:nvSpPr>
-          <p:cNvPr id="5" name="Rectangle 4">
-            <a:extLst>
-              <a:ext uri="{FF2B5EF4-FFF2-40B4-BE49-F238E27FC236}">
-                <a16:creationId xmlns:a16="http://schemas.microsoft.com/office/drawing/2014/main" id="{E630EDE2-E0E2-4859-973C-825DB1477E43}"/>
-              </a:ext>
-            </a:extLst>
-          </p:cNvPr>
-          <p:cNvSpPr/>
-          <p:nvPr/>
-        </p:nvSpPr>
-        <p:spPr>
-          <a:xfrm>
-            <a:off x="43199500" y="0"/>
-            <a:ext cx="3600000" cy="46799500"/>
-          </a:xfrm>
-          <a:prstGeom prst="rect">
-            <a:avLst/>
-          </a:prstGeom>
-        </p:spPr>
-        <p:style>
-          <a:lnRef idx="2">
-            <a:schemeClr val="accent1">
-              <a:shade val="50000"/>
-            </a:schemeClr>
-          </a:lnRef>
-          <a:fillRef idx="1">
-            <a:schemeClr val="accent1"/>
-          </a:fillRef>
-          <a:effectRef idx="0">
-            <a:schemeClr val="accent1"/>
-          </a:effectRef>
-          <a:fontRef idx="minor">
-            <a:schemeClr val="lt1"/>
-          </a:fontRef>
-        </p:style>
-        <p:txBody>
-          <a:bodyPr rtlCol="0" anchor="ctr"/>
-          <a:lstStyle/>
-          <a:p>
-            <a:pPr algn="ctr"/>
-            <a:endParaRPr lang="en-GB"/>
-          </a:p>
-        </p:txBody>
-      </p:sp>
-      <p:sp>
-        <p:nvSpPr>
-          <p:cNvPr id="6" name="Rectangle 5">
-            <a:extLst>
-              <a:ext uri="{FF2B5EF4-FFF2-40B4-BE49-F238E27FC236}">
-                <a16:creationId xmlns:a16="http://schemas.microsoft.com/office/drawing/2014/main" id="{E90624B1-39E7-4039-B97B-FC0D5D33AF92}"/>
-              </a:ext>
-            </a:extLst>
-          </p:cNvPr>
-          <p:cNvSpPr/>
-          <p:nvPr/>
-        </p:nvSpPr>
-        <p:spPr>
-          <a:xfrm>
-            <a:off x="0" y="0"/>
-            <a:ext cx="46799500" cy="3600000"/>
-          </a:xfrm>
-          <a:prstGeom prst="rect">
-            <a:avLst/>
-          </a:prstGeom>
-        </p:spPr>
-        <p:style>
-          <a:lnRef idx="2">
-            <a:schemeClr val="accent1">
-              <a:shade val="50000"/>
-            </a:schemeClr>
-          </a:lnRef>
-          <a:fillRef idx="1">
-            <a:schemeClr val="accent1"/>
-          </a:fillRef>
-          <a:effectRef idx="0">
-            <a:schemeClr val="accent1"/>
-          </a:effectRef>
-          <a:fontRef idx="minor">
-            <a:schemeClr val="lt1"/>
-          </a:fontRef>
-        </p:style>
-        <p:txBody>
-          <a:bodyPr rtlCol="0" anchor="ctr"/>
-          <a:lstStyle/>
-          <a:p>
-            <a:pPr algn="ctr"/>
-            <a:endParaRPr lang="en-GB"/>
-          </a:p>
-        </p:txBody>
-      </p:sp>
-      <p:sp>
-        <p:nvSpPr>
-          <p:cNvPr id="7" name="Rectangle 6">
-            <a:extLst>
-              <a:ext uri="{FF2B5EF4-FFF2-40B4-BE49-F238E27FC236}">
-                <a16:creationId xmlns:a16="http://schemas.microsoft.com/office/drawing/2014/main" id="{E75E5C21-3C9E-40C8-85F7-3B6472B22853}"/>
-              </a:ext>
-            </a:extLst>
-          </p:cNvPr>
-          <p:cNvSpPr/>
-          <p:nvPr/>
-        </p:nvSpPr>
-        <p:spPr>
-          <a:xfrm>
-            <a:off x="0" y="43199500"/>
-            <a:ext cx="46799500" cy="3600000"/>
-          </a:xfrm>
-          <a:prstGeom prst="rect">
-            <a:avLst/>
-          </a:prstGeom>
-        </p:spPr>
-        <p:style>
-          <a:lnRef idx="2">
-            <a:schemeClr val="accent1">
-              <a:shade val="50000"/>
-            </a:schemeClr>
-          </a:lnRef>
-          <a:fillRef idx="1">
-            <a:schemeClr val="accent1"/>
-          </a:fillRef>
-          <a:effectRef idx="0">
-            <a:schemeClr val="accent1"/>
-          </a:effectRef>
-          <a:fontRef idx="minor">
-            <a:schemeClr val="lt1"/>
-          </a:fontRef>
-        </p:style>
-        <p:txBody>
-          <a:bodyPr rtlCol="0" anchor="ctr"/>
-          <a:lstStyle/>
-          <a:p>
-            <a:pPr algn="ctr"/>
-            <a:endParaRPr lang="en-GB"/>
-          </a:p>
-        </p:txBody>
-      </p:sp>
-      <p:sp>
-        <p:nvSpPr>
           <p:cNvPr id="9" name="TextBox 8">
             <a:extLst>
               <a:ext uri="{FF2B5EF4-FFF2-40B4-BE49-F238E27FC236}">
@@ -4515,8 +4331,8 @@
         </p:nvSpPr>
         <p:spPr>
           <a:xfrm>
-            <a:off x="3600000" y="3600000"/>
-            <a:ext cx="39599500" cy="12849671"/>
+            <a:off x="0" y="0"/>
+            <a:ext cx="46799500" cy="18466594"/>
           </a:xfrm>
           <a:prstGeom prst="rect">
             <a:avLst/>
@@ -4530,7 +4346,7 @@
           <a:lstStyle/>
           <a:p>
             <a:r>
-              <a:rPr lang="en-GB" sz="82900" u="sng" dirty="0">
+              <a:rPr lang="en-GB" sz="119400" u="sng" dirty="0">
                 <a:solidFill>
                   <a:schemeClr val="bg1"/>
                 </a:solidFill>
@@ -4613,10 +4429,10 @@
       </p:grpSpPr>
       <p:sp>
         <p:nvSpPr>
-          <p:cNvPr id="2" name="TextBox 1">
+          <p:cNvPr id="3" name="TextBox 2">
             <a:extLst>
               <a:ext uri="{FF2B5EF4-FFF2-40B4-BE49-F238E27FC236}">
-                <a16:creationId xmlns:a16="http://schemas.microsoft.com/office/drawing/2014/main" id="{65881C29-D269-4979-99B4-CFAC867C5DB4}"/>
+                <a16:creationId xmlns:a16="http://schemas.microsoft.com/office/drawing/2014/main" id="{F6152440-9D04-4400-BC55-89BF9CE31A02}"/>
               </a:ext>
             </a:extLst>
           </p:cNvPr>
@@ -4625,8 +4441,8 @@
         </p:nvSpPr>
         <p:spPr>
           <a:xfrm>
-            <a:off x="3600000" y="3600000"/>
-            <a:ext cx="39599500" cy="12849671"/>
+            <a:off x="0" y="0"/>
+            <a:ext cx="46799500" cy="15404217"/>
           </a:xfrm>
           <a:prstGeom prst="rect">
             <a:avLst/>
@@ -4640,7 +4456,7 @@
           <a:lstStyle/>
           <a:p>
             <a:r>
-              <a:rPr lang="en-GB" sz="82900" u="sng" dirty="0">
+              <a:rPr lang="en-GB" sz="99500" u="sng" dirty="0">
                 <a:solidFill>
                   <a:schemeClr val="bg1"/>
                 </a:solidFill>
@@ -4683,10 +4499,10 @@
       </p:grpSpPr>
       <p:sp>
         <p:nvSpPr>
-          <p:cNvPr id="2" name="TextBox 1">
+          <p:cNvPr id="3" name="TextBox 2">
             <a:extLst>
               <a:ext uri="{FF2B5EF4-FFF2-40B4-BE49-F238E27FC236}">
-                <a16:creationId xmlns:a16="http://schemas.microsoft.com/office/drawing/2014/main" id="{65881C29-D269-4979-99B4-CFAC867C5DB4}"/>
+                <a16:creationId xmlns:a16="http://schemas.microsoft.com/office/drawing/2014/main" id="{FB8CA170-B7D8-4389-BF61-1BE5FC8B48ED}"/>
               </a:ext>
             </a:extLst>
           </p:cNvPr>
@@ -4695,8 +4511,8 @@
         </p:nvSpPr>
         <p:spPr>
           <a:xfrm>
-            <a:off x="3600000" y="3600000"/>
-            <a:ext cx="39599500" cy="12849671"/>
+            <a:off x="0" y="0"/>
+            <a:ext cx="46799500" cy="15404217"/>
           </a:xfrm>
           <a:prstGeom prst="rect">
             <a:avLst/>
@@ -4710,7 +4526,7 @@
           <a:lstStyle/>
           <a:p>
             <a:r>
-              <a:rPr lang="en-GB" sz="82900" u="sng" dirty="0" err="1">
+              <a:rPr lang="en-GB" sz="99500" u="sng" dirty="0" err="1">
                 <a:solidFill>
                   <a:schemeClr val="bg1"/>
                 </a:solidFill>
@@ -4719,7 +4535,7 @@
               <a:t>Img</a:t>
             </a:r>
             <a:r>
-              <a:rPr lang="en-GB" sz="82900" u="sng" dirty="0">
+              <a:rPr lang="en-GB" sz="99500" u="sng" dirty="0">
                 <a:solidFill>
                   <a:schemeClr val="bg1"/>
                 </a:solidFill>
@@ -4762,10 +4578,10 @@
       </p:grpSpPr>
       <p:sp>
         <p:nvSpPr>
-          <p:cNvPr id="2" name="TextBox 1">
+          <p:cNvPr id="3" name="TextBox 2">
             <a:extLst>
               <a:ext uri="{FF2B5EF4-FFF2-40B4-BE49-F238E27FC236}">
-                <a16:creationId xmlns:a16="http://schemas.microsoft.com/office/drawing/2014/main" id="{65881C29-D269-4979-99B4-CFAC867C5DB4}"/>
+                <a16:creationId xmlns:a16="http://schemas.microsoft.com/office/drawing/2014/main" id="{AE7CE890-FC74-402E-B32F-693E11D79233}"/>
               </a:ext>
             </a:extLst>
           </p:cNvPr>
@@ -4774,8 +4590,8 @@
         </p:nvSpPr>
         <p:spPr>
           <a:xfrm>
-            <a:off x="3600000" y="3600000"/>
-            <a:ext cx="39599500" cy="12849671"/>
+            <a:off x="0" y="0"/>
+            <a:ext cx="46799500" cy="15404217"/>
           </a:xfrm>
           <a:prstGeom prst="rect">
             <a:avLst/>
@@ -4789,7 +4605,7 @@
           <a:lstStyle/>
           <a:p>
             <a:r>
-              <a:rPr lang="en-GB" sz="82900" u="sng" dirty="0">
+              <a:rPr lang="en-GB" sz="99500" u="sng" dirty="0">
                 <a:solidFill>
                   <a:schemeClr val="bg1"/>
                 </a:solidFill>
@@ -4832,10 +4648,10 @@
       </p:grpSpPr>
       <p:sp>
         <p:nvSpPr>
-          <p:cNvPr id="2" name="TextBox 1">
+          <p:cNvPr id="3" name="TextBox 2">
             <a:extLst>
               <a:ext uri="{FF2B5EF4-FFF2-40B4-BE49-F238E27FC236}">
-                <a16:creationId xmlns:a16="http://schemas.microsoft.com/office/drawing/2014/main" id="{65881C29-D269-4979-99B4-CFAC867C5DB4}"/>
+                <a16:creationId xmlns:a16="http://schemas.microsoft.com/office/drawing/2014/main" id="{FC408FD6-8628-4479-9809-AF0D90536930}"/>
               </a:ext>
             </a:extLst>
           </p:cNvPr>
@@ -4844,8 +4660,8 @@
         </p:nvSpPr>
         <p:spPr>
           <a:xfrm>
-            <a:off x="3600000" y="3600000"/>
-            <a:ext cx="39599500" cy="12849671"/>
+            <a:off x="0" y="0"/>
+            <a:ext cx="46799500" cy="15404217"/>
           </a:xfrm>
           <a:prstGeom prst="rect">
             <a:avLst/>
@@ -4859,7 +4675,7 @@
           <a:lstStyle/>
           <a:p>
             <a:r>
-              <a:rPr lang="en-GB" sz="82900" u="sng" dirty="0">
+              <a:rPr lang="en-GB" sz="99500" u="sng" dirty="0">
                 <a:solidFill>
                   <a:schemeClr val="bg1"/>
                 </a:solidFill>
@@ -4902,10 +4718,10 @@
       </p:grpSpPr>
       <p:sp>
         <p:nvSpPr>
-          <p:cNvPr id="2" name="TextBox 1">
+          <p:cNvPr id="3" name="TextBox 2">
             <a:extLst>
               <a:ext uri="{FF2B5EF4-FFF2-40B4-BE49-F238E27FC236}">
-                <a16:creationId xmlns:a16="http://schemas.microsoft.com/office/drawing/2014/main" id="{65881C29-D269-4979-99B4-CFAC867C5DB4}"/>
+                <a16:creationId xmlns:a16="http://schemas.microsoft.com/office/drawing/2014/main" id="{DB982D8A-2708-4C48-8F69-3C141C56CF0A}"/>
               </a:ext>
             </a:extLst>
           </p:cNvPr>
@@ -4914,8 +4730,8 @@
         </p:nvSpPr>
         <p:spPr>
           <a:xfrm>
-            <a:off x="3600000" y="3600000"/>
-            <a:ext cx="39599500" cy="12849671"/>
+            <a:off x="0" y="0"/>
+            <a:ext cx="46799500" cy="15404217"/>
           </a:xfrm>
           <a:prstGeom prst="rect">
             <a:avLst/>
@@ -4929,7 +4745,7 @@
           <a:lstStyle/>
           <a:p>
             <a:r>
-              <a:rPr lang="en-GB" sz="82900" u="sng" dirty="0">
+              <a:rPr lang="en-GB" sz="99500" u="sng" dirty="0">
                 <a:solidFill>
                   <a:schemeClr val="bg1"/>
                 </a:solidFill>
@@ -7403,10 +7219,10 @@
       </p:grpSpPr>
       <p:sp>
         <p:nvSpPr>
-          <p:cNvPr id="2" name="TextBox 1">
+          <p:cNvPr id="4" name="TextBox 3">
             <a:extLst>
               <a:ext uri="{FF2B5EF4-FFF2-40B4-BE49-F238E27FC236}">
-                <a16:creationId xmlns:a16="http://schemas.microsoft.com/office/drawing/2014/main" id="{65881C29-D269-4979-99B4-CFAC867C5DB4}"/>
+                <a16:creationId xmlns:a16="http://schemas.microsoft.com/office/drawing/2014/main" id="{C20865D0-152C-4C9D-A2D5-9584EFC9241C}"/>
               </a:ext>
             </a:extLst>
           </p:cNvPr>
@@ -7415,8 +7231,8 @@
         </p:nvSpPr>
         <p:spPr>
           <a:xfrm>
-            <a:off x="3600000" y="3600000"/>
-            <a:ext cx="39599500" cy="12849671"/>
+            <a:off x="0" y="0"/>
+            <a:ext cx="46799500" cy="15404217"/>
           </a:xfrm>
           <a:prstGeom prst="rect">
             <a:avLst/>
@@ -7430,7 +7246,7 @@
           <a:lstStyle/>
           <a:p>
             <a:r>
-              <a:rPr lang="en-GB" sz="82900" u="sng" dirty="0">
+              <a:rPr lang="en-GB" sz="99500" u="sng" dirty="0">
                 <a:solidFill>
                   <a:schemeClr val="bg1"/>
                 </a:solidFill>
@@ -7473,10 +7289,10 @@
       </p:grpSpPr>
       <p:sp>
         <p:nvSpPr>
-          <p:cNvPr id="2" name="TextBox 1">
+          <p:cNvPr id="3" name="TextBox 2">
             <a:extLst>
               <a:ext uri="{FF2B5EF4-FFF2-40B4-BE49-F238E27FC236}">
-                <a16:creationId xmlns:a16="http://schemas.microsoft.com/office/drawing/2014/main" id="{65881C29-D269-4979-99B4-CFAC867C5DB4}"/>
+                <a16:creationId xmlns:a16="http://schemas.microsoft.com/office/drawing/2014/main" id="{38792E1D-91E1-4C8C-8195-A9FC01BF86BC}"/>
               </a:ext>
             </a:extLst>
           </p:cNvPr>
@@ -7485,8 +7301,8 @@
         </p:nvSpPr>
         <p:spPr>
           <a:xfrm>
-            <a:off x="3600000" y="3600000"/>
-            <a:ext cx="39599500" cy="12865060"/>
+            <a:off x="0" y="0"/>
+            <a:ext cx="46799500" cy="18435816"/>
           </a:xfrm>
           <a:prstGeom prst="rect">
             <a:avLst/>
@@ -7500,25 +7316,27 @@
           <a:lstStyle/>
           <a:p>
             <a:r>
-              <a:rPr lang="en-GB" sz="41500" u="sng" dirty="0">
+              <a:rPr lang="en-GB" sz="59600" u="sng" dirty="0">
                 <a:solidFill>
-                  <a:schemeClr val="bg1"/>
+                  <a:srgbClr val="FFFFFF"/>
                 </a:solidFill>
                 <a:latin typeface="Futura New Bold" panose="020B0902020204020203" pitchFamily="34" charset="0"/>
               </a:rPr>
               <a:t>Active </a:t>
             </a:r>
+            <a:endParaRPr lang="en-GB" sz="59600" dirty="0"/>
           </a:p>
           <a:p>
             <a:r>
-              <a:rPr lang="en-GB" sz="41500" u="sng" dirty="0">
+              <a:rPr lang="en-GB" sz="59600" u="sng" dirty="0">
                 <a:solidFill>
-                  <a:schemeClr val="bg1"/>
+                  <a:srgbClr val="FFFFFF"/>
                 </a:solidFill>
                 <a:latin typeface="Futura New Bold" panose="020B0902020204020203" pitchFamily="34" charset="0"/>
               </a:rPr>
               <a:t>Camera(s)</a:t>
             </a:r>
+            <a:endParaRPr lang="en-GB" sz="59600" dirty="0"/>
           </a:p>
         </p:txBody>
       </p:sp>
@@ -7554,10 +7372,10 @@
       </p:grpSpPr>
       <p:sp>
         <p:nvSpPr>
-          <p:cNvPr id="2" name="TextBox 1">
+          <p:cNvPr id="3" name="TextBox 2">
             <a:extLst>
               <a:ext uri="{FF2B5EF4-FFF2-40B4-BE49-F238E27FC236}">
-                <a16:creationId xmlns:a16="http://schemas.microsoft.com/office/drawing/2014/main" id="{65881C29-D269-4979-99B4-CFAC867C5DB4}"/>
+                <a16:creationId xmlns:a16="http://schemas.microsoft.com/office/drawing/2014/main" id="{9B2C337A-A8D0-4ECA-940D-4BB2454D6280}"/>
               </a:ext>
             </a:extLst>
           </p:cNvPr>
@@ -7566,8 +7384,8 @@
         </p:nvSpPr>
         <p:spPr>
           <a:xfrm>
-            <a:off x="3600000" y="3600000"/>
-            <a:ext cx="39599500" cy="12849671"/>
+            <a:off x="0" y="0"/>
+            <a:ext cx="46799500" cy="15404217"/>
           </a:xfrm>
           <a:prstGeom prst="rect">
             <a:avLst/>
@@ -7581,7 +7399,7 @@
           <a:lstStyle/>
           <a:p>
             <a:r>
-              <a:rPr lang="en-GB" sz="82900" u="sng" dirty="0">
+              <a:rPr lang="en-GB" sz="99500" u="sng" dirty="0">
                 <a:solidFill>
                   <a:schemeClr val="bg1"/>
                 </a:solidFill>
@@ -7624,10 +7442,10 @@
       </p:grpSpPr>
       <p:sp>
         <p:nvSpPr>
-          <p:cNvPr id="2" name="TextBox 1">
+          <p:cNvPr id="3" name="TextBox 2">
             <a:extLst>
               <a:ext uri="{FF2B5EF4-FFF2-40B4-BE49-F238E27FC236}">
-                <a16:creationId xmlns:a16="http://schemas.microsoft.com/office/drawing/2014/main" id="{65881C29-D269-4979-99B4-CFAC867C5DB4}"/>
+                <a16:creationId xmlns:a16="http://schemas.microsoft.com/office/drawing/2014/main" id="{34181996-D329-4192-B0AD-C2A743CD03CA}"/>
               </a:ext>
             </a:extLst>
           </p:cNvPr>
@@ -7636,8 +7454,8 @@
         </p:nvSpPr>
         <p:spPr>
           <a:xfrm>
-            <a:off x="3600000" y="3600000"/>
-            <a:ext cx="39599500" cy="12849671"/>
+            <a:off x="0" y="0"/>
+            <a:ext cx="46799500" cy="15404217"/>
           </a:xfrm>
           <a:prstGeom prst="rect">
             <a:avLst/>
@@ -7651,7 +7469,7 @@
           <a:lstStyle/>
           <a:p>
             <a:r>
-              <a:rPr lang="en-GB" sz="82900" u="sng" dirty="0">
+              <a:rPr lang="en-GB" sz="99500" u="sng" dirty="0">
                 <a:solidFill>
                   <a:schemeClr val="bg1"/>
                 </a:solidFill>
@@ -7694,10 +7512,10 @@
       </p:grpSpPr>
       <p:sp>
         <p:nvSpPr>
-          <p:cNvPr id="2" name="TextBox 1">
+          <p:cNvPr id="3" name="TextBox 2">
             <a:extLst>
               <a:ext uri="{FF2B5EF4-FFF2-40B4-BE49-F238E27FC236}">
-                <a16:creationId xmlns:a16="http://schemas.microsoft.com/office/drawing/2014/main" id="{65881C29-D269-4979-99B4-CFAC867C5DB4}"/>
+                <a16:creationId xmlns:a16="http://schemas.microsoft.com/office/drawing/2014/main" id="{89455395-F35F-4076-B91E-F2EB13AFF3C1}"/>
               </a:ext>
             </a:extLst>
           </p:cNvPr>
@@ -7706,8 +7524,8 @@
         </p:nvSpPr>
         <p:spPr>
           <a:xfrm>
-            <a:off x="3600000" y="3600000"/>
-            <a:ext cx="39599500" cy="12849671"/>
+            <a:off x="0" y="0"/>
+            <a:ext cx="46799500" cy="15404217"/>
           </a:xfrm>
           <a:prstGeom prst="rect">
             <a:avLst/>
@@ -7721,7 +7539,7 @@
           <a:lstStyle/>
           <a:p>
             <a:r>
-              <a:rPr lang="en-GB" sz="82900" u="sng" dirty="0">
+              <a:rPr lang="en-GB" sz="99500" u="sng" dirty="0">
                 <a:solidFill>
                   <a:schemeClr val="bg1"/>
                 </a:solidFill>
@@ -7764,10 +7582,10 @@
       </p:grpSpPr>
       <p:sp>
         <p:nvSpPr>
-          <p:cNvPr id="2" name="TextBox 1">
+          <p:cNvPr id="3" name="TextBox 2">
             <a:extLst>
               <a:ext uri="{FF2B5EF4-FFF2-40B4-BE49-F238E27FC236}">
-                <a16:creationId xmlns:a16="http://schemas.microsoft.com/office/drawing/2014/main" id="{65881C29-D269-4979-99B4-CFAC867C5DB4}"/>
+                <a16:creationId xmlns:a16="http://schemas.microsoft.com/office/drawing/2014/main" id="{9A0C8E3F-B223-430F-9661-B1FD99555140}"/>
               </a:ext>
             </a:extLst>
           </p:cNvPr>
@@ -7776,8 +7594,8 @@
         </p:nvSpPr>
         <p:spPr>
           <a:xfrm>
-            <a:off x="3600000" y="3600000"/>
-            <a:ext cx="39599500" cy="12865060"/>
+            <a:off x="0" y="0"/>
+            <a:ext cx="46799500" cy="9264075"/>
           </a:xfrm>
           <a:prstGeom prst="rect">
             <a:avLst/>
@@ -7791,25 +7609,15 @@
           <a:lstStyle/>
           <a:p>
             <a:r>
-              <a:rPr lang="en-GB" sz="41500" u="sng" dirty="0">
+              <a:rPr lang="en-GB" sz="59600" u="sng" dirty="0">
                 <a:solidFill>
-                  <a:schemeClr val="bg1"/>
+                  <a:srgbClr val="FFFFFF"/>
                 </a:solidFill>
                 <a:latin typeface="Futura New Bold" panose="020B0902020204020203" pitchFamily="34" charset="0"/>
               </a:rPr>
-              <a:t>Red </a:t>
+              <a:t>RED GAIN</a:t>
             </a:r>
-          </a:p>
-          <a:p>
-            <a:r>
-              <a:rPr lang="en-GB" sz="41500" u="sng" dirty="0">
-                <a:solidFill>
-                  <a:schemeClr val="bg1"/>
-                </a:solidFill>
-                <a:latin typeface="Futura New Bold" panose="020B0902020204020203" pitchFamily="34" charset="0"/>
-              </a:rPr>
-              <a:t>gain</a:t>
-            </a:r>
+            <a:endParaRPr lang="en-GB" sz="59600" dirty="0"/>
           </a:p>
         </p:txBody>
       </p:sp>
@@ -7845,10 +7653,10 @@
       </p:grpSpPr>
       <p:sp>
         <p:nvSpPr>
-          <p:cNvPr id="2" name="TextBox 1">
+          <p:cNvPr id="3" name="TextBox 2">
             <a:extLst>
               <a:ext uri="{FF2B5EF4-FFF2-40B4-BE49-F238E27FC236}">
-                <a16:creationId xmlns:a16="http://schemas.microsoft.com/office/drawing/2014/main" id="{65881C29-D269-4979-99B4-CFAC867C5DB4}"/>
+                <a16:creationId xmlns:a16="http://schemas.microsoft.com/office/drawing/2014/main" id="{1F9D5ED9-12D3-46AE-97D3-B6D7A1D82A1E}"/>
               </a:ext>
             </a:extLst>
           </p:cNvPr>
@@ -7857,8 +7665,8 @@
         </p:nvSpPr>
         <p:spPr>
           <a:xfrm>
-            <a:off x="3600000" y="3600000"/>
-            <a:ext cx="39599500" cy="12865060"/>
+            <a:off x="0" y="0"/>
+            <a:ext cx="46799500" cy="9264075"/>
           </a:xfrm>
           <a:prstGeom prst="rect">
             <a:avLst/>
@@ -7872,25 +7680,15 @@
           <a:lstStyle/>
           <a:p>
             <a:r>
-              <a:rPr lang="en-GB" sz="41500" u="sng" dirty="0">
+              <a:rPr lang="en-GB" sz="59600" u="sng" dirty="0">
                 <a:solidFill>
-                  <a:schemeClr val="bg1"/>
+                  <a:srgbClr val="FFFFFF"/>
                 </a:solidFill>
                 <a:latin typeface="Futura New Bold" panose="020B0902020204020203" pitchFamily="34" charset="0"/>
               </a:rPr>
-              <a:t>Blue </a:t>
+              <a:t>BLUE GAIN</a:t>
             </a:r>
-          </a:p>
-          <a:p>
-            <a:r>
-              <a:rPr lang="en-GB" sz="41500" u="sng" dirty="0">
-                <a:solidFill>
-                  <a:schemeClr val="bg1"/>
-                </a:solidFill>
-                <a:latin typeface="Futura New Bold" panose="020B0902020204020203" pitchFamily="34" charset="0"/>
-              </a:rPr>
-              <a:t>gain</a:t>
-            </a:r>
+            <a:endParaRPr lang="en-GB" sz="59600" dirty="0"/>
           </a:p>
         </p:txBody>
       </p:sp>
@@ -8347,18 +8145,18 @@
 </file>
 
 <file path=customXml/item2.xml><?xml version="1.0" encoding="utf-8"?>
-<p:properties xmlns:p="http://schemas.microsoft.com/office/2006/metadata/properties" xmlns:xsi="http://www.w3.org/2001/XMLSchema-instance" xmlns:pc="http://schemas.microsoft.com/office/infopath/2007/PartnerControls">
-  <documentManagement/>
-</p:properties>
-</file>
-
-<file path=customXml/item3.xml><?xml version="1.0" encoding="utf-8"?>
 <?mso-contentType ?>
 <FormTemplates xmlns="http://schemas.microsoft.com/sharepoint/v3/contenttype/forms">
   <Display>DocumentLibraryForm</Display>
   <Edit>DocumentLibraryForm</Edit>
   <New>DocumentLibraryForm</New>
 </FormTemplates>
+</file>
+
+<file path=customXml/item3.xml><?xml version="1.0" encoding="utf-8"?>
+<p:properties xmlns:p="http://schemas.microsoft.com/office/2006/metadata/properties" xmlns:xsi="http://www.w3.org/2001/XMLSchema-instance" xmlns:pc="http://schemas.microsoft.com/office/infopath/2007/PartnerControls">
+  <documentManagement/>
+</p:properties>
 </file>
 
 <file path=customXml/itemProps1.xml><?xml version="1.0" encoding="utf-8"?>
@@ -8380,18 +8178,18 @@
 </file>
 
 <file path=customXml/itemProps2.xml><?xml version="1.0" encoding="utf-8"?>
+<ds:datastoreItem xmlns:ds="http://schemas.openxmlformats.org/officeDocument/2006/customXml" ds:itemID="{3AAD6433-F0FD-4D4E-8667-5F6FE899708B}">
+  <ds:schemaRefs>
+    <ds:schemaRef ds:uri="http://schemas.microsoft.com/sharepoint/v3/contenttype/forms"/>
+  </ds:schemaRefs>
+</ds:datastoreItem>
+</file>
+
+<file path=customXml/itemProps3.xml><?xml version="1.0" encoding="utf-8"?>
 <ds:datastoreItem xmlns:ds="http://schemas.openxmlformats.org/officeDocument/2006/customXml" ds:itemID="{135E9EDB-E06E-4E56-8BCC-DE9DFA790FD7}">
   <ds:schemaRefs>
     <ds:schemaRef ds:uri="http://schemas.microsoft.com/office/2006/metadata/properties"/>
     <ds:schemaRef ds:uri="http://schemas.microsoft.com/office/infopath/2007/PartnerControls"/>
   </ds:schemaRefs>
 </ds:datastoreItem>
-</file>
-
-<file path=customXml/itemProps3.xml><?xml version="1.0" encoding="utf-8"?>
-<ds:datastoreItem xmlns:ds="http://schemas.openxmlformats.org/officeDocument/2006/customXml" ds:itemID="{3AAD6433-F0FD-4D4E-8667-5F6FE899708B}">
-  <ds:schemaRefs>
-    <ds:schemaRef ds:uri="http://schemas.microsoft.com/sharepoint/v3/contenttype/forms"/>
-  </ds:schemaRefs>
-</ds:datastoreItem>
 </file>
</xml_diff>